<commit_message>
Chap04: Modification of the figure under bias voltage
</commit_message>
<xml_diff>
--- a/04-CrMagOpt/Pictures/EfieldX-Xc.pptx
+++ b/04-CrMagOpt/Pictures/EfieldX-Xc.pptx
@@ -7,7 +7,7 @@
   <p:sldIdLst>
     <p:sldId id="256" r:id="rId2"/>
   </p:sldIdLst>
-  <p:sldSz cx="8461375" cy="6769100"/>
+  <p:sldSz cx="8461375" cy="6911975"/>
   <p:notesSz cx="6858000" cy="9144000"/>
   <p:defaultTextStyle>
     <a:defPPr>
@@ -136,8 +136,8 @@
         </p:nvSpPr>
         <p:spPr>
           <a:xfrm>
-            <a:off x="634604" y="2102808"/>
-            <a:ext cx="7192169" cy="1450970"/>
+            <a:off x="634606" y="2147192"/>
+            <a:ext cx="7192169" cy="1481596"/>
           </a:xfrm>
         </p:spPr>
         <p:txBody>
@@ -164,8 +164,8 @@
         </p:nvSpPr>
         <p:spPr>
           <a:xfrm>
-            <a:off x="1269207" y="3835823"/>
-            <a:ext cx="5922963" cy="1729881"/>
+            <a:off x="1269209" y="3916787"/>
+            <a:ext cx="5922963" cy="1766393"/>
           </a:xfrm>
         </p:spPr>
         <p:txBody>
@@ -288,7 +288,7 @@
           <a:p>
             <a:fld id="{6BFA78DB-14DC-41AF-B126-0E499707604E}" type="datetimeFigureOut">
               <a:rPr lang="fr-FR" smtClean="0"/>
-              <a:t>04/04/2017</a:t>
+              <a:t>08/11/2017</a:t>
             </a:fld>
             <a:endParaRPr lang="fr-FR"/>
           </a:p>
@@ -458,7 +458,7 @@
           <a:p>
             <a:fld id="{6BFA78DB-14DC-41AF-B126-0E499707604E}" type="datetimeFigureOut">
               <a:rPr lang="fr-FR" smtClean="0"/>
-              <a:t>04/04/2017</a:t>
+              <a:t>08/11/2017</a:t>
             </a:fld>
             <a:endParaRPr lang="fr-FR"/>
           </a:p>
@@ -548,8 +548,8 @@
         </p:nvSpPr>
         <p:spPr>
           <a:xfrm>
-            <a:off x="5677643" y="255410"/>
-            <a:ext cx="1761317" cy="5457586"/>
+            <a:off x="5677645" y="260801"/>
+            <a:ext cx="1761317" cy="5572779"/>
           </a:xfrm>
         </p:spPr>
         <p:txBody>
@@ -576,8 +576,8 @@
         </p:nvSpPr>
         <p:spPr>
           <a:xfrm>
-            <a:off x="392221" y="255410"/>
-            <a:ext cx="5144398" cy="5457586"/>
+            <a:off x="392221" y="260801"/>
+            <a:ext cx="5144398" cy="5572779"/>
           </a:xfrm>
         </p:spPr>
         <p:txBody>
@@ -638,7 +638,7 @@
           <a:p>
             <a:fld id="{6BFA78DB-14DC-41AF-B126-0E499707604E}" type="datetimeFigureOut">
               <a:rPr lang="fr-FR" smtClean="0"/>
-              <a:t>04/04/2017</a:t>
+              <a:t>08/11/2017</a:t>
             </a:fld>
             <a:endParaRPr lang="fr-FR"/>
           </a:p>
@@ -808,7 +808,7 @@
           <a:p>
             <a:fld id="{6BFA78DB-14DC-41AF-B126-0E499707604E}" type="datetimeFigureOut">
               <a:rPr lang="fr-FR" smtClean="0"/>
-              <a:t>04/04/2017</a:t>
+              <a:t>08/11/2017</a:t>
             </a:fld>
             <a:endParaRPr lang="fr-FR"/>
           </a:p>
@@ -898,8 +898,8 @@
         </p:nvSpPr>
         <p:spPr>
           <a:xfrm>
-            <a:off x="668390" y="4349775"/>
-            <a:ext cx="7192169" cy="1344418"/>
+            <a:off x="668392" y="4441586"/>
+            <a:ext cx="7192169" cy="1372794"/>
           </a:xfrm>
         </p:spPr>
         <p:txBody>
@@ -930,8 +930,8 @@
         </p:nvSpPr>
         <p:spPr>
           <a:xfrm>
-            <a:off x="668390" y="2869034"/>
-            <a:ext cx="7192169" cy="1480740"/>
+            <a:off x="668392" y="2929591"/>
+            <a:ext cx="7192169" cy="1511994"/>
           </a:xfrm>
         </p:spPr>
         <p:txBody>
@@ -1054,7 +1054,7 @@
           <a:p>
             <a:fld id="{6BFA78DB-14DC-41AF-B126-0E499707604E}" type="datetimeFigureOut">
               <a:rPr lang="fr-FR" smtClean="0"/>
-              <a:t>04/04/2017</a:t>
+              <a:t>08/11/2017</a:t>
             </a:fld>
             <a:endParaRPr lang="fr-FR"/>
           </a:p>
@@ -1167,8 +1167,8 @@
         </p:nvSpPr>
         <p:spPr>
           <a:xfrm>
-            <a:off x="392221" y="1491711"/>
-            <a:ext cx="3452123" cy="4221286"/>
+            <a:off x="392223" y="1523197"/>
+            <a:ext cx="3452123" cy="4310385"/>
           </a:xfrm>
         </p:spPr>
         <p:txBody>
@@ -1252,8 +1252,8 @@
         </p:nvSpPr>
         <p:spPr>
           <a:xfrm>
-            <a:off x="3985367" y="1491711"/>
-            <a:ext cx="3453592" cy="4221286"/>
+            <a:off x="3985367" y="1523197"/>
+            <a:ext cx="3453592" cy="4310385"/>
           </a:xfrm>
         </p:spPr>
         <p:txBody>
@@ -1342,7 +1342,7 @@
           <a:p>
             <a:fld id="{6BFA78DB-14DC-41AF-B126-0E499707604E}" type="datetimeFigureOut">
               <a:rPr lang="fr-FR" smtClean="0"/>
-              <a:t>04/04/2017</a:t>
+              <a:t>08/11/2017</a:t>
             </a:fld>
             <a:endParaRPr lang="fr-FR"/>
           </a:p>
@@ -1432,8 +1432,8 @@
         </p:nvSpPr>
         <p:spPr>
           <a:xfrm>
-            <a:off x="423069" y="271079"/>
-            <a:ext cx="7615238" cy="1128183"/>
+            <a:off x="423069" y="276802"/>
+            <a:ext cx="7615238" cy="1151995"/>
           </a:xfrm>
         </p:spPr>
         <p:txBody>
@@ -1464,8 +1464,8 @@
         </p:nvSpPr>
         <p:spPr>
           <a:xfrm>
-            <a:off x="423070" y="1515213"/>
-            <a:ext cx="3738577" cy="631469"/>
+            <a:off x="423072" y="1547195"/>
+            <a:ext cx="3738577" cy="644797"/>
           </a:xfrm>
         </p:spPr>
         <p:txBody>
@@ -1529,8 +1529,8 @@
         </p:nvSpPr>
         <p:spPr>
           <a:xfrm>
-            <a:off x="423070" y="2146683"/>
-            <a:ext cx="3738577" cy="3900068"/>
+            <a:off x="423072" y="2191993"/>
+            <a:ext cx="3738577" cy="3982387"/>
           </a:xfrm>
         </p:spPr>
         <p:txBody>
@@ -1614,8 +1614,8 @@
         </p:nvSpPr>
         <p:spPr>
           <a:xfrm>
-            <a:off x="4298263" y="1515213"/>
-            <a:ext cx="3740045" cy="631469"/>
+            <a:off x="4298265" y="1547195"/>
+            <a:ext cx="3740045" cy="644797"/>
           </a:xfrm>
         </p:spPr>
         <p:txBody>
@@ -1679,8 +1679,8 @@
         </p:nvSpPr>
         <p:spPr>
           <a:xfrm>
-            <a:off x="4298263" y="2146683"/>
-            <a:ext cx="3740045" cy="3900068"/>
+            <a:off x="4298265" y="2191993"/>
+            <a:ext cx="3740045" cy="3982387"/>
           </a:xfrm>
         </p:spPr>
         <p:txBody>
@@ -1769,7 +1769,7 @@
           <a:p>
             <a:fld id="{6BFA78DB-14DC-41AF-B126-0E499707604E}" type="datetimeFigureOut">
               <a:rPr lang="fr-FR" smtClean="0"/>
-              <a:t>04/04/2017</a:t>
+              <a:t>08/11/2017</a:t>
             </a:fld>
             <a:endParaRPr lang="fr-FR"/>
           </a:p>
@@ -1887,7 +1887,7 @@
           <a:p>
             <a:fld id="{6BFA78DB-14DC-41AF-B126-0E499707604E}" type="datetimeFigureOut">
               <a:rPr lang="fr-FR" smtClean="0"/>
-              <a:t>04/04/2017</a:t>
+              <a:t>08/11/2017</a:t>
             </a:fld>
             <a:endParaRPr lang="fr-FR"/>
           </a:p>
@@ -1982,7 +1982,7 @@
           <a:p>
             <a:fld id="{6BFA78DB-14DC-41AF-B126-0E499707604E}" type="datetimeFigureOut">
               <a:rPr lang="fr-FR" smtClean="0"/>
-              <a:t>04/04/2017</a:t>
+              <a:t>08/11/2017</a:t>
             </a:fld>
             <a:endParaRPr lang="fr-FR"/>
           </a:p>
@@ -2072,8 +2072,8 @@
         </p:nvSpPr>
         <p:spPr>
           <a:xfrm>
-            <a:off x="423069" y="269511"/>
-            <a:ext cx="2783734" cy="1146986"/>
+            <a:off x="423069" y="275200"/>
+            <a:ext cx="2783734" cy="1171196"/>
           </a:xfrm>
         </p:spPr>
         <p:txBody>
@@ -2104,8 +2104,8 @@
         </p:nvSpPr>
         <p:spPr>
           <a:xfrm>
-            <a:off x="3308162" y="269511"/>
-            <a:ext cx="4730144" cy="5777239"/>
+            <a:off x="3308162" y="275201"/>
+            <a:ext cx="4730144" cy="5899178"/>
           </a:xfrm>
         </p:spPr>
         <p:txBody>
@@ -2189,8 +2189,8 @@
         </p:nvSpPr>
         <p:spPr>
           <a:xfrm>
-            <a:off x="423069" y="1416497"/>
-            <a:ext cx="2783734" cy="4630253"/>
+            <a:off x="423069" y="1446395"/>
+            <a:ext cx="2783734" cy="4727984"/>
           </a:xfrm>
         </p:spPr>
         <p:txBody>
@@ -2259,7 +2259,7 @@
           <a:p>
             <a:fld id="{6BFA78DB-14DC-41AF-B126-0E499707604E}" type="datetimeFigureOut">
               <a:rPr lang="fr-FR" smtClean="0"/>
-              <a:t>04/04/2017</a:t>
+              <a:t>08/11/2017</a:t>
             </a:fld>
             <a:endParaRPr lang="fr-FR"/>
           </a:p>
@@ -2349,8 +2349,8 @@
         </p:nvSpPr>
         <p:spPr>
           <a:xfrm>
-            <a:off x="1658490" y="4738370"/>
-            <a:ext cx="5076825" cy="559391"/>
+            <a:off x="1658492" y="4838384"/>
+            <a:ext cx="5076825" cy="571198"/>
           </a:xfrm>
         </p:spPr>
         <p:txBody>
@@ -2381,8 +2381,8 @@
         </p:nvSpPr>
         <p:spPr>
           <a:xfrm>
-            <a:off x="1658490" y="604833"/>
-            <a:ext cx="5076825" cy="4061460"/>
+            <a:off x="1658492" y="617600"/>
+            <a:ext cx="5076825" cy="4147185"/>
           </a:xfrm>
         </p:spPr>
         <p:txBody>
@@ -2442,8 +2442,8 @@
         </p:nvSpPr>
         <p:spPr>
           <a:xfrm>
-            <a:off x="1658490" y="5297761"/>
-            <a:ext cx="5076825" cy="794429"/>
+            <a:off x="1658492" y="5409582"/>
+            <a:ext cx="5076825" cy="811197"/>
           </a:xfrm>
         </p:spPr>
         <p:txBody>
@@ -2512,7 +2512,7 @@
           <a:p>
             <a:fld id="{6BFA78DB-14DC-41AF-B126-0E499707604E}" type="datetimeFigureOut">
               <a:rPr lang="fr-FR" smtClean="0"/>
-              <a:t>04/04/2017</a:t>
+              <a:t>08/11/2017</a:t>
             </a:fld>
             <a:endParaRPr lang="fr-FR"/>
           </a:p>
@@ -2607,8 +2607,8 @@
         </p:nvSpPr>
         <p:spPr>
           <a:xfrm>
-            <a:off x="423069" y="271079"/>
-            <a:ext cx="7615238" cy="1128183"/>
+            <a:off x="423069" y="276802"/>
+            <a:ext cx="7615238" cy="1151995"/>
           </a:xfrm>
           <a:prstGeom prst="rect">
             <a:avLst/>
@@ -2640,8 +2640,8 @@
         </p:nvSpPr>
         <p:spPr>
           <a:xfrm>
-            <a:off x="423069" y="1579457"/>
-            <a:ext cx="7615238" cy="4467293"/>
+            <a:off x="423069" y="1612795"/>
+            <a:ext cx="7615238" cy="4561584"/>
           </a:xfrm>
           <a:prstGeom prst="rect">
             <a:avLst/>
@@ -2702,8 +2702,8 @@
         </p:nvSpPr>
         <p:spPr>
           <a:xfrm>
-            <a:off x="423070" y="6273954"/>
-            <a:ext cx="1974321" cy="360392"/>
+            <a:off x="423072" y="6406379"/>
+            <a:ext cx="1974321" cy="367998"/>
           </a:xfrm>
           <a:prstGeom prst="rect">
             <a:avLst/>
@@ -2725,7 +2725,7 @@
           <a:p>
             <a:fld id="{6BFA78DB-14DC-41AF-B126-0E499707604E}" type="datetimeFigureOut">
               <a:rPr lang="fr-FR" smtClean="0"/>
-              <a:t>04/04/2017</a:t>
+              <a:t>08/11/2017</a:t>
             </a:fld>
             <a:endParaRPr lang="fr-FR"/>
           </a:p>
@@ -2743,8 +2743,8 @@
         </p:nvSpPr>
         <p:spPr>
           <a:xfrm>
-            <a:off x="2890971" y="6273954"/>
-            <a:ext cx="2679435" cy="360392"/>
+            <a:off x="2890973" y="6406379"/>
+            <a:ext cx="2679435" cy="367998"/>
           </a:xfrm>
           <a:prstGeom prst="rect">
             <a:avLst/>
@@ -2780,8 +2780,8 @@
         </p:nvSpPr>
         <p:spPr>
           <a:xfrm>
-            <a:off x="6063985" y="6273954"/>
-            <a:ext cx="1974321" cy="360392"/>
+            <a:off x="6063987" y="6406379"/>
+            <a:ext cx="1974321" cy="367998"/>
           </a:xfrm>
           <a:prstGeom prst="rect">
             <a:avLst/>
@@ -3102,7 +3102,7 @@
       </p:grpSpPr>
       <p:pic>
         <p:nvPicPr>
-          <p:cNvPr id="1026" name="Picture 2"/>
+          <p:cNvPr id="84" name="Picture 2"/>
           <p:cNvPicPr>
             <a:picLocks noChangeAspect="1" noChangeArrowheads="1"/>
           </p:cNvPicPr>
@@ -3164,30 +3164,728 @@
           </a:extLst>
         </p:spPr>
       </p:pic>
+      <p:sp>
+        <p:nvSpPr>
+          <p:cNvPr id="85" name="ZoneTexte 84"/>
+          <p:cNvSpPr txBox="1"/>
+          <p:nvPr/>
+        </p:nvSpPr>
+        <p:spPr>
+          <a:xfrm>
+            <a:off x="-89793" y="174"/>
+            <a:ext cx="526106" cy="461665"/>
+          </a:xfrm>
+          <a:prstGeom prst="rect">
+            <a:avLst/>
+          </a:prstGeom>
+          <a:noFill/>
+        </p:spPr>
+        <p:txBody>
+          <a:bodyPr wrap="none" rtlCol="0">
+            <a:spAutoFit/>
+          </a:bodyPr>
+          <a:lstStyle/>
+          <a:p>
+            <a:r>
+              <a:rPr lang="fr-FR" sz="2400" dirty="0" smtClean="0">
+                <a:latin typeface="Times New Roman" pitchFamily="18" charset="0"/>
+                <a:cs typeface="Times New Roman" pitchFamily="18" charset="0"/>
+              </a:rPr>
+              <a:t>(a)</a:t>
+            </a:r>
+            <a:endParaRPr lang="fr-FR" sz="2400" dirty="0">
+              <a:latin typeface="Times New Roman" pitchFamily="18" charset="0"/>
+              <a:cs typeface="Times New Roman" pitchFamily="18" charset="0"/>
+            </a:endParaRPr>
+          </a:p>
+        </p:txBody>
+      </p:sp>
+      <p:sp>
+        <p:nvSpPr>
+          <p:cNvPr id="86" name="ZoneTexte 85"/>
+          <p:cNvSpPr txBox="1"/>
+          <p:nvPr/>
+        </p:nvSpPr>
+        <p:spPr>
+          <a:xfrm>
+            <a:off x="5598839" y="174"/>
+            <a:ext cx="543739" cy="461665"/>
+          </a:xfrm>
+          <a:prstGeom prst="rect">
+            <a:avLst/>
+          </a:prstGeom>
+          <a:noFill/>
+        </p:spPr>
+        <p:txBody>
+          <a:bodyPr wrap="none" rtlCol="0">
+            <a:spAutoFit/>
+          </a:bodyPr>
+          <a:lstStyle/>
+          <a:p>
+            <a:r>
+              <a:rPr lang="fr-FR" sz="2400" dirty="0" smtClean="0">
+                <a:latin typeface="Times New Roman" pitchFamily="18" charset="0"/>
+                <a:cs typeface="Times New Roman" pitchFamily="18" charset="0"/>
+              </a:rPr>
+              <a:t>(b)</a:t>
+            </a:r>
+            <a:endParaRPr lang="fr-FR" sz="2400" dirty="0">
+              <a:latin typeface="Times New Roman" pitchFamily="18" charset="0"/>
+              <a:cs typeface="Times New Roman" pitchFamily="18" charset="0"/>
+            </a:endParaRPr>
+          </a:p>
+        </p:txBody>
+      </p:sp>
+      <p:sp>
+        <p:nvSpPr>
+          <p:cNvPr id="87" name="ZoneTexte 86"/>
+          <p:cNvSpPr txBox="1"/>
+          <p:nvPr/>
+        </p:nvSpPr>
+        <p:spPr>
+          <a:xfrm>
+            <a:off x="1494383" y="4723085"/>
+            <a:ext cx="526106" cy="461665"/>
+          </a:xfrm>
+          <a:prstGeom prst="rect">
+            <a:avLst/>
+          </a:prstGeom>
+          <a:noFill/>
+        </p:spPr>
+        <p:txBody>
+          <a:bodyPr wrap="none" rtlCol="0">
+            <a:spAutoFit/>
+          </a:bodyPr>
+          <a:lstStyle/>
+          <a:p>
+            <a:r>
+              <a:rPr lang="fr-FR" sz="2400" dirty="0" smtClean="0">
+                <a:latin typeface="Times New Roman" pitchFamily="18" charset="0"/>
+                <a:cs typeface="Times New Roman" pitchFamily="18" charset="0"/>
+              </a:rPr>
+              <a:t>(c)</a:t>
+            </a:r>
+            <a:endParaRPr lang="fr-FR" sz="2400" dirty="0">
+              <a:latin typeface="Times New Roman" pitchFamily="18" charset="0"/>
+              <a:cs typeface="Times New Roman" pitchFamily="18" charset="0"/>
+            </a:endParaRPr>
+          </a:p>
+        </p:txBody>
+      </p:sp>
+      <p:sp>
+        <p:nvSpPr>
+          <p:cNvPr id="88" name="Rectangle 87"/>
+          <p:cNvSpPr/>
+          <p:nvPr/>
+        </p:nvSpPr>
+        <p:spPr>
+          <a:xfrm>
+            <a:off x="2145022" y="6004142"/>
+            <a:ext cx="2181338" cy="423412"/>
+          </a:xfrm>
+          <a:prstGeom prst="rect">
+            <a:avLst/>
+          </a:prstGeom>
+          <a:solidFill>
+            <a:srgbClr val="0066CC"/>
+          </a:solidFill>
+          <a:ln>
+            <a:noFill/>
+          </a:ln>
+        </p:spPr>
+        <p:style>
+          <a:lnRef idx="2">
+            <a:schemeClr val="accent1">
+              <a:shade val="50000"/>
+            </a:schemeClr>
+          </a:lnRef>
+          <a:fillRef idx="1">
+            <a:schemeClr val="accent1"/>
+          </a:fillRef>
+          <a:effectRef idx="0">
+            <a:schemeClr val="accent1"/>
+          </a:effectRef>
+          <a:fontRef idx="minor">
+            <a:schemeClr val="lt1"/>
+          </a:fontRef>
+        </p:style>
+        <p:txBody>
+          <a:bodyPr rtlCol="0" anchor="ctr"/>
+          <a:lstStyle/>
+          <a:p>
+            <a:pPr algn="ctr"/>
+            <a:endParaRPr lang="en-US"/>
+          </a:p>
+        </p:txBody>
+      </p:sp>
+      <p:sp>
+        <p:nvSpPr>
+          <p:cNvPr id="89" name="Rectangle 88"/>
+          <p:cNvSpPr/>
+          <p:nvPr/>
+        </p:nvSpPr>
+        <p:spPr>
+          <a:xfrm>
+            <a:off x="2145022" y="5681354"/>
+            <a:ext cx="2181338" cy="43804"/>
+          </a:xfrm>
+          <a:prstGeom prst="rect">
+            <a:avLst/>
+          </a:prstGeom>
+          <a:solidFill>
+            <a:srgbClr val="FF0000"/>
+          </a:solidFill>
+          <a:ln>
+            <a:noFill/>
+          </a:ln>
+        </p:spPr>
+        <p:style>
+          <a:lnRef idx="2">
+            <a:schemeClr val="accent1">
+              <a:shade val="50000"/>
+            </a:schemeClr>
+          </a:lnRef>
+          <a:fillRef idx="1">
+            <a:schemeClr val="accent1"/>
+          </a:fillRef>
+          <a:effectRef idx="0">
+            <a:schemeClr val="accent1"/>
+          </a:effectRef>
+          <a:fontRef idx="minor">
+            <a:schemeClr val="lt1"/>
+          </a:fontRef>
+        </p:style>
+        <p:txBody>
+          <a:bodyPr rtlCol="0" anchor="ctr"/>
+          <a:lstStyle/>
+          <a:p>
+            <a:pPr algn="ctr"/>
+            <a:endParaRPr lang="en-US"/>
+          </a:p>
+        </p:txBody>
+      </p:sp>
+      <p:sp>
+        <p:nvSpPr>
+          <p:cNvPr id="90" name="Ellipse 89"/>
+          <p:cNvSpPr/>
+          <p:nvPr/>
+        </p:nvSpPr>
+        <p:spPr>
+          <a:xfrm>
+            <a:off x="2247154" y="5587173"/>
+            <a:ext cx="211097" cy="137984"/>
+          </a:xfrm>
+          <a:prstGeom prst="ellipse">
+            <a:avLst/>
+          </a:prstGeom>
+          <a:solidFill>
+            <a:srgbClr val="FF0000"/>
+          </a:solidFill>
+          <a:ln>
+            <a:noFill/>
+          </a:ln>
+        </p:spPr>
+        <p:style>
+          <a:lnRef idx="2">
+            <a:schemeClr val="accent1">
+              <a:shade val="50000"/>
+            </a:schemeClr>
+          </a:lnRef>
+          <a:fillRef idx="1">
+            <a:schemeClr val="accent1"/>
+          </a:fillRef>
+          <a:effectRef idx="0">
+            <a:schemeClr val="accent1"/>
+          </a:effectRef>
+          <a:fontRef idx="minor">
+            <a:schemeClr val="lt1"/>
+          </a:fontRef>
+        </p:style>
+        <p:txBody>
+          <a:bodyPr rtlCol="0" anchor="ctr"/>
+          <a:lstStyle/>
+          <a:p>
+            <a:pPr algn="ctr"/>
+            <a:endParaRPr lang="en-US"/>
+          </a:p>
+        </p:txBody>
+      </p:sp>
+      <p:sp>
+        <p:nvSpPr>
+          <p:cNvPr id="91" name="Ellipse 90"/>
+          <p:cNvSpPr/>
+          <p:nvPr/>
+        </p:nvSpPr>
+        <p:spPr>
+          <a:xfrm>
+            <a:off x="2637582" y="5587173"/>
+            <a:ext cx="211097" cy="137984"/>
+          </a:xfrm>
+          <a:prstGeom prst="ellipse">
+            <a:avLst/>
+          </a:prstGeom>
+          <a:solidFill>
+            <a:srgbClr val="FF0000"/>
+          </a:solidFill>
+          <a:ln>
+            <a:noFill/>
+          </a:ln>
+        </p:spPr>
+        <p:style>
+          <a:lnRef idx="2">
+            <a:schemeClr val="accent1">
+              <a:shade val="50000"/>
+            </a:schemeClr>
+          </a:lnRef>
+          <a:fillRef idx="1">
+            <a:schemeClr val="accent1"/>
+          </a:fillRef>
+          <a:effectRef idx="0">
+            <a:schemeClr val="accent1"/>
+          </a:effectRef>
+          <a:fontRef idx="minor">
+            <a:schemeClr val="lt1"/>
+          </a:fontRef>
+        </p:style>
+        <p:txBody>
+          <a:bodyPr rtlCol="0" anchor="ctr"/>
+          <a:lstStyle/>
+          <a:p>
+            <a:pPr algn="ctr"/>
+            <a:endParaRPr lang="en-US"/>
+          </a:p>
+        </p:txBody>
+      </p:sp>
+      <p:sp>
+        <p:nvSpPr>
+          <p:cNvPr id="92" name="Ellipse 91"/>
+          <p:cNvSpPr/>
+          <p:nvPr/>
+        </p:nvSpPr>
+        <p:spPr>
+          <a:xfrm>
+            <a:off x="2919045" y="5587173"/>
+            <a:ext cx="211097" cy="137984"/>
+          </a:xfrm>
+          <a:prstGeom prst="ellipse">
+            <a:avLst/>
+          </a:prstGeom>
+          <a:solidFill>
+            <a:srgbClr val="FF0000"/>
+          </a:solidFill>
+          <a:ln>
+            <a:noFill/>
+          </a:ln>
+        </p:spPr>
+        <p:style>
+          <a:lnRef idx="2">
+            <a:schemeClr val="accent1">
+              <a:shade val="50000"/>
+            </a:schemeClr>
+          </a:lnRef>
+          <a:fillRef idx="1">
+            <a:schemeClr val="accent1"/>
+          </a:fillRef>
+          <a:effectRef idx="0">
+            <a:schemeClr val="accent1"/>
+          </a:effectRef>
+          <a:fontRef idx="minor">
+            <a:schemeClr val="lt1"/>
+          </a:fontRef>
+        </p:style>
+        <p:txBody>
+          <a:bodyPr rtlCol="0" anchor="ctr"/>
+          <a:lstStyle/>
+          <a:p>
+            <a:pPr algn="ctr"/>
+            <a:endParaRPr lang="en-US"/>
+          </a:p>
+        </p:txBody>
+      </p:sp>
+      <p:sp>
+        <p:nvSpPr>
+          <p:cNvPr id="93" name="Ellipse 92"/>
+          <p:cNvSpPr/>
+          <p:nvPr/>
+        </p:nvSpPr>
+        <p:spPr>
+          <a:xfrm>
+            <a:off x="3481971" y="5587173"/>
+            <a:ext cx="211097" cy="137984"/>
+          </a:xfrm>
+          <a:prstGeom prst="ellipse">
+            <a:avLst/>
+          </a:prstGeom>
+          <a:solidFill>
+            <a:srgbClr val="FF0000"/>
+          </a:solidFill>
+          <a:ln>
+            <a:noFill/>
+          </a:ln>
+        </p:spPr>
+        <p:style>
+          <a:lnRef idx="2">
+            <a:schemeClr val="accent1">
+              <a:shade val="50000"/>
+            </a:schemeClr>
+          </a:lnRef>
+          <a:fillRef idx="1">
+            <a:schemeClr val="accent1"/>
+          </a:fillRef>
+          <a:effectRef idx="0">
+            <a:schemeClr val="accent1"/>
+          </a:effectRef>
+          <a:fontRef idx="minor">
+            <a:schemeClr val="lt1"/>
+          </a:fontRef>
+        </p:style>
+        <p:txBody>
+          <a:bodyPr rtlCol="0" anchor="ctr"/>
+          <a:lstStyle/>
+          <a:p>
+            <a:pPr algn="ctr"/>
+            <a:endParaRPr lang="en-US"/>
+          </a:p>
+        </p:txBody>
+      </p:sp>
+      <p:sp>
+        <p:nvSpPr>
+          <p:cNvPr id="94" name="Ellipse 93"/>
+          <p:cNvSpPr/>
+          <p:nvPr/>
+        </p:nvSpPr>
+        <p:spPr>
+          <a:xfrm>
+            <a:off x="4044897" y="5587173"/>
+            <a:ext cx="211097" cy="137984"/>
+          </a:xfrm>
+          <a:prstGeom prst="ellipse">
+            <a:avLst/>
+          </a:prstGeom>
+          <a:solidFill>
+            <a:srgbClr val="FF0000"/>
+          </a:solidFill>
+          <a:ln>
+            <a:noFill/>
+          </a:ln>
+        </p:spPr>
+        <p:style>
+          <a:lnRef idx="2">
+            <a:schemeClr val="accent1">
+              <a:shade val="50000"/>
+            </a:schemeClr>
+          </a:lnRef>
+          <a:fillRef idx="1">
+            <a:schemeClr val="accent1"/>
+          </a:fillRef>
+          <a:effectRef idx="0">
+            <a:schemeClr val="accent1"/>
+          </a:effectRef>
+          <a:fontRef idx="minor">
+            <a:schemeClr val="lt1"/>
+          </a:fontRef>
+        </p:style>
+        <p:txBody>
+          <a:bodyPr rtlCol="0" anchor="ctr"/>
+          <a:lstStyle/>
+          <a:p>
+            <a:pPr algn="ctr"/>
+            <a:endParaRPr lang="en-US"/>
+          </a:p>
+        </p:txBody>
+      </p:sp>
+      <p:sp>
+        <p:nvSpPr>
+          <p:cNvPr id="95" name="Rectangle 94"/>
+          <p:cNvSpPr/>
+          <p:nvPr/>
+        </p:nvSpPr>
+        <p:spPr>
+          <a:xfrm>
+            <a:off x="2145022" y="5329828"/>
+            <a:ext cx="2181338" cy="43804"/>
+          </a:xfrm>
+          <a:prstGeom prst="rect">
+            <a:avLst/>
+          </a:prstGeom>
+          <a:solidFill>
+            <a:srgbClr val="FFFF00"/>
+          </a:solidFill>
+          <a:ln>
+            <a:noFill/>
+          </a:ln>
+        </p:spPr>
+        <p:style>
+          <a:lnRef idx="2">
+            <a:schemeClr val="accent1">
+              <a:shade val="50000"/>
+            </a:schemeClr>
+          </a:lnRef>
+          <a:fillRef idx="1">
+            <a:schemeClr val="accent1"/>
+          </a:fillRef>
+          <a:effectRef idx="0">
+            <a:schemeClr val="accent1"/>
+          </a:effectRef>
+          <a:fontRef idx="minor">
+            <a:schemeClr val="lt1"/>
+          </a:fontRef>
+        </p:style>
+        <p:txBody>
+          <a:bodyPr rtlCol="0" anchor="ctr"/>
+          <a:lstStyle/>
+          <a:p>
+            <a:pPr algn="ctr"/>
+            <a:endParaRPr lang="en-US"/>
+          </a:p>
+        </p:txBody>
+      </p:sp>
+      <p:cxnSp>
+        <p:nvCxnSpPr>
+          <p:cNvPr id="96" name="Connecteur droit 95"/>
+          <p:cNvCxnSpPr>
+            <a:endCxn id="95" idx="1"/>
+          </p:cNvCxnSpPr>
+          <p:nvPr/>
+        </p:nvCxnSpPr>
+        <p:spPr>
+          <a:xfrm flipV="1">
+            <a:off x="2145022" y="5351730"/>
+            <a:ext cx="0" cy="1075826"/>
+          </a:xfrm>
+          <a:prstGeom prst="line">
+            <a:avLst/>
+          </a:prstGeom>
+        </p:spPr>
+        <p:style>
+          <a:lnRef idx="1">
+            <a:schemeClr val="accent2"/>
+          </a:lnRef>
+          <a:fillRef idx="0">
+            <a:schemeClr val="accent2"/>
+          </a:fillRef>
+          <a:effectRef idx="0">
+            <a:schemeClr val="accent2"/>
+          </a:effectRef>
+          <a:fontRef idx="minor">
+            <a:schemeClr val="tx1"/>
+          </a:fontRef>
+        </p:style>
+      </p:cxnSp>
+      <p:cxnSp>
+        <p:nvCxnSpPr>
+          <p:cNvPr id="97" name="Connecteur droit 96"/>
+          <p:cNvCxnSpPr>
+            <a:endCxn id="95" idx="3"/>
+          </p:cNvCxnSpPr>
+          <p:nvPr/>
+        </p:nvCxnSpPr>
+        <p:spPr>
+          <a:xfrm flipH="1" flipV="1">
+            <a:off x="4326360" y="5351730"/>
+            <a:ext cx="1" cy="1075826"/>
+          </a:xfrm>
+          <a:prstGeom prst="line">
+            <a:avLst/>
+          </a:prstGeom>
+        </p:spPr>
+        <p:style>
+          <a:lnRef idx="1">
+            <a:schemeClr val="accent2"/>
+          </a:lnRef>
+          <a:fillRef idx="0">
+            <a:schemeClr val="accent2"/>
+          </a:fillRef>
+          <a:effectRef idx="0">
+            <a:schemeClr val="accent2"/>
+          </a:effectRef>
+          <a:fontRef idx="minor">
+            <a:schemeClr val="tx1"/>
+          </a:fontRef>
+        </p:style>
+      </p:cxnSp>
+      <p:cxnSp>
+        <p:nvCxnSpPr>
+          <p:cNvPr id="98" name="Connecteur droit 97"/>
+          <p:cNvCxnSpPr/>
+          <p:nvPr/>
+        </p:nvCxnSpPr>
+        <p:spPr>
+          <a:xfrm>
+            <a:off x="2145022" y="5373632"/>
+            <a:ext cx="2181338" cy="0"/>
+          </a:xfrm>
+          <a:prstGeom prst="line">
+            <a:avLst/>
+          </a:prstGeom>
+        </p:spPr>
+        <p:style>
+          <a:lnRef idx="1">
+            <a:schemeClr val="accent2"/>
+          </a:lnRef>
+          <a:fillRef idx="0">
+            <a:schemeClr val="accent2"/>
+          </a:fillRef>
+          <a:effectRef idx="0">
+            <a:schemeClr val="accent2"/>
+          </a:effectRef>
+          <a:fontRef idx="minor">
+            <a:schemeClr val="tx1"/>
+          </a:fontRef>
+        </p:style>
+      </p:cxnSp>
+      <p:sp>
+        <p:nvSpPr>
+          <p:cNvPr id="99" name="Rectangle 98"/>
+          <p:cNvSpPr/>
+          <p:nvPr/>
+        </p:nvSpPr>
+        <p:spPr>
+          <a:xfrm>
+            <a:off x="2097096" y="6104745"/>
+            <a:ext cx="751583" cy="276999"/>
+          </a:xfrm>
+          <a:prstGeom prst="rect">
+            <a:avLst/>
+          </a:prstGeom>
+        </p:spPr>
+        <p:txBody>
+          <a:bodyPr wrap="square">
+            <a:spAutoFit/>
+          </a:bodyPr>
+          <a:lstStyle/>
+          <a:p>
+            <a:r>
+              <a:rPr lang="en-US" sz="1200" dirty="0">
+                <a:latin typeface="Times New Roman" panose="02020603050405020304" pitchFamily="18" charset="0"/>
+                <a:cs typeface="Times New Roman" panose="02020603050405020304" pitchFamily="18" charset="0"/>
+              </a:rPr>
+              <a:t>p-</a:t>
+            </a:r>
+            <a:r>
+              <a:rPr lang="en-US" sz="1200" dirty="0" err="1">
+                <a:latin typeface="Times New Roman" panose="02020603050405020304" pitchFamily="18" charset="0"/>
+                <a:cs typeface="Times New Roman" panose="02020603050405020304" pitchFamily="18" charset="0"/>
+              </a:rPr>
+              <a:t>ZnTe</a:t>
+            </a:r>
+            <a:endParaRPr lang="en-US" sz="1200" dirty="0">
+              <a:latin typeface="Times New Roman" panose="02020603050405020304" pitchFamily="18" charset="0"/>
+              <a:cs typeface="Times New Roman" panose="02020603050405020304" pitchFamily="18" charset="0"/>
+            </a:endParaRPr>
+          </a:p>
+        </p:txBody>
+      </p:sp>
+      <p:sp>
+        <p:nvSpPr>
+          <p:cNvPr id="100" name="Rectangle 99"/>
+          <p:cNvSpPr/>
+          <p:nvPr/>
+        </p:nvSpPr>
+        <p:spPr>
+          <a:xfrm>
+            <a:off x="2101356" y="5733672"/>
+            <a:ext cx="1665522" cy="276999"/>
+          </a:xfrm>
+          <a:prstGeom prst="rect">
+            <a:avLst/>
+          </a:prstGeom>
+        </p:spPr>
+        <p:txBody>
+          <a:bodyPr wrap="square">
+            <a:spAutoFit/>
+          </a:bodyPr>
+          <a:lstStyle/>
+          <a:p>
+            <a:r>
+              <a:rPr lang="en-US" sz="1200" dirty="0" err="1" smtClean="0">
+                <a:latin typeface="Times New Roman" panose="02020603050405020304" pitchFamily="18" charset="0"/>
+                <a:cs typeface="Times New Roman" panose="02020603050405020304" pitchFamily="18" charset="0"/>
+              </a:rPr>
+              <a:t>i-ZnTe</a:t>
+            </a:r>
+            <a:r>
+              <a:rPr lang="en-US" sz="1200" dirty="0" smtClean="0">
+                <a:latin typeface="Times New Roman" panose="02020603050405020304" pitchFamily="18" charset="0"/>
+                <a:cs typeface="Times New Roman" panose="02020603050405020304" pitchFamily="18" charset="0"/>
+              </a:rPr>
+              <a:t> (150 - 200 nm)</a:t>
+            </a:r>
+            <a:endParaRPr lang="en-US" sz="1200" dirty="0">
+              <a:latin typeface="Times New Roman" panose="02020603050405020304" pitchFamily="18" charset="0"/>
+              <a:cs typeface="Times New Roman" panose="02020603050405020304" pitchFamily="18" charset="0"/>
+            </a:endParaRPr>
+          </a:p>
+        </p:txBody>
+      </p:sp>
+      <p:sp>
+        <p:nvSpPr>
+          <p:cNvPr id="101" name="Rectangle 100"/>
+          <p:cNvSpPr/>
+          <p:nvPr/>
+        </p:nvSpPr>
+        <p:spPr>
+          <a:xfrm>
+            <a:off x="1388757" y="5236194"/>
+            <a:ext cx="887502" cy="276999"/>
+          </a:xfrm>
+          <a:prstGeom prst="rect">
+            <a:avLst/>
+          </a:prstGeom>
+        </p:spPr>
+        <p:txBody>
+          <a:bodyPr wrap="square">
+            <a:spAutoFit/>
+          </a:bodyPr>
+          <a:lstStyle/>
+          <a:p>
+            <a:r>
+              <a:rPr lang="en-US" sz="1200" dirty="0" smtClean="0">
+                <a:latin typeface="Times New Roman" panose="02020603050405020304" pitchFamily="18" charset="0"/>
+                <a:cs typeface="Times New Roman" panose="02020603050405020304" pitchFamily="18" charset="0"/>
+              </a:rPr>
+              <a:t>Au (</a:t>
+            </a:r>
+            <a:r>
+              <a:rPr lang="en-US" sz="1200" dirty="0">
+                <a:latin typeface="Times New Roman" panose="02020603050405020304" pitchFamily="18" charset="0"/>
+                <a:cs typeface="Times New Roman" panose="02020603050405020304" pitchFamily="18" charset="0"/>
+              </a:rPr>
+              <a:t>6 </a:t>
+            </a:r>
+            <a:r>
+              <a:rPr lang="en-US" sz="1200" dirty="0" smtClean="0">
+                <a:latin typeface="Times New Roman" panose="02020603050405020304" pitchFamily="18" charset="0"/>
+                <a:cs typeface="Times New Roman" panose="02020603050405020304" pitchFamily="18" charset="0"/>
+              </a:rPr>
+              <a:t>nm)</a:t>
+            </a:r>
+            <a:endParaRPr lang="en-US" sz="1200" dirty="0">
+              <a:latin typeface="Times New Roman" panose="02020603050405020304" pitchFamily="18" charset="0"/>
+              <a:cs typeface="Times New Roman" panose="02020603050405020304" pitchFamily="18" charset="0"/>
+            </a:endParaRPr>
+          </a:p>
+        </p:txBody>
+      </p:sp>
       <p:pic>
         <p:nvPicPr>
-          <p:cNvPr id="2" name="Image 1"/>
+          <p:cNvPr id="102" name="Image 101" descr="Image3.png"/>
           <p:cNvPicPr>
             <a:picLocks noChangeAspect="1"/>
           </p:cNvPicPr>
           <p:nvPr/>
         </p:nvPicPr>
         <p:blipFill>
-          <a:blip r:embed="rId3">
-            <a:extLst>
-              <a:ext uri="{28A0092B-C50C-407E-A947-70E740481C1C}">
-                <a14:useLocalDpi xmlns:a14="http://schemas.microsoft.com/office/drawing/2010/main" val="0"/>
-              </a:ext>
-            </a:extLst>
-          </a:blip>
+          <a:blip r:embed="rId3" cstate="print"/>
+          <a:srcRect b="48823"/>
           <a:stretch>
             <a:fillRect/>
           </a:stretch>
         </p:blipFill>
         <p:spPr>
           <a:xfrm>
-            <a:off x="1350367" y="4890369"/>
-            <a:ext cx="3663393" cy="1810362"/>
+            <a:off x="2168932" y="4752702"/>
+            <a:ext cx="1875965" cy="577126"/>
           </a:xfrm>
           <a:prstGeom prst="rect">
             <a:avLst/>
@@ -3196,112 +3894,680 @@
       </p:pic>
       <p:sp>
         <p:nvSpPr>
-          <p:cNvPr id="3" name="ZoneTexte 2"/>
-          <p:cNvSpPr txBox="1"/>
+          <p:cNvPr id="103" name="Rectangle 102"/>
+          <p:cNvSpPr/>
           <p:nvPr/>
         </p:nvSpPr>
         <p:spPr>
           <a:xfrm>
-            <a:off x="-89793" y="174"/>
-            <a:ext cx="526106" cy="461665"/>
+            <a:off x="2343901" y="5085323"/>
+            <a:ext cx="413008" cy="276999"/>
           </a:xfrm>
           <a:prstGeom prst="rect">
             <a:avLst/>
           </a:prstGeom>
-          <a:noFill/>
-        </p:spPr>
-        <p:txBody>
-          <a:bodyPr wrap="none" rtlCol="0">
+        </p:spPr>
+        <p:txBody>
+          <a:bodyPr wrap="square">
             <a:spAutoFit/>
           </a:bodyPr>
           <a:lstStyle/>
           <a:p>
             <a:r>
-              <a:rPr lang="fr-FR" sz="2400" dirty="0" smtClean="0">
-                <a:latin typeface="Times New Roman" pitchFamily="18" charset="0"/>
-                <a:cs typeface="Times New Roman" pitchFamily="18" charset="0"/>
+              <a:rPr lang="en-US" sz="1200" dirty="0" smtClean="0">
+                <a:latin typeface="Times New Roman" panose="02020603050405020304" pitchFamily="18" charset="0"/>
+                <a:cs typeface="Times New Roman" panose="02020603050405020304" pitchFamily="18" charset="0"/>
               </a:rPr>
-              <a:t>(a)</a:t>
-            </a:r>
-            <a:endParaRPr lang="fr-FR" sz="2400" dirty="0">
-              <a:latin typeface="Times New Roman" pitchFamily="18" charset="0"/>
-              <a:cs typeface="Times New Roman" pitchFamily="18" charset="0"/>
+              <a:t>SIL</a:t>
+            </a:r>
+            <a:endParaRPr lang="en-US" sz="1200" dirty="0">
+              <a:latin typeface="Times New Roman" panose="02020603050405020304" pitchFamily="18" charset="0"/>
+              <a:cs typeface="Times New Roman" panose="02020603050405020304" pitchFamily="18" charset="0"/>
             </a:endParaRPr>
           </a:p>
         </p:txBody>
       </p:sp>
       <p:sp>
         <p:nvSpPr>
-          <p:cNvPr id="6" name="ZoneTexte 5"/>
-          <p:cNvSpPr txBox="1"/>
+          <p:cNvPr id="104" name="Ellipse 103"/>
+          <p:cNvSpPr/>
           <p:nvPr/>
         </p:nvSpPr>
         <p:spPr>
           <a:xfrm>
-            <a:off x="5598839" y="174"/>
-            <a:ext cx="543739" cy="461665"/>
+            <a:off x="4748555" y="5551373"/>
+            <a:ext cx="422194" cy="389266"/>
+          </a:xfrm>
+          <a:prstGeom prst="ellipse">
+            <a:avLst/>
+          </a:prstGeom>
+        </p:spPr>
+        <p:style>
+          <a:lnRef idx="2">
+            <a:schemeClr val="accent6"/>
+          </a:lnRef>
+          <a:fillRef idx="1">
+            <a:schemeClr val="lt1"/>
+          </a:fillRef>
+          <a:effectRef idx="0">
+            <a:schemeClr val="accent6"/>
+          </a:effectRef>
+          <a:fontRef idx="minor">
+            <a:schemeClr val="dk1"/>
+          </a:fontRef>
+        </p:style>
+        <p:txBody>
+          <a:bodyPr rtlCol="0" anchor="ctr"/>
+          <a:lstStyle/>
+          <a:p>
+            <a:pPr algn="ctr"/>
+            <a:endParaRPr lang="en-US"/>
+          </a:p>
+        </p:txBody>
+      </p:sp>
+      <p:cxnSp>
+        <p:nvCxnSpPr>
+          <p:cNvPr id="105" name="Connecteur droit 104"/>
+          <p:cNvCxnSpPr/>
+          <p:nvPr/>
+        </p:nvCxnSpPr>
+        <p:spPr>
+          <a:xfrm flipV="1">
+            <a:off x="4150446" y="4890686"/>
+            <a:ext cx="0" cy="434396"/>
+          </a:xfrm>
+          <a:prstGeom prst="line">
+            <a:avLst/>
+          </a:prstGeom>
+          <a:ln>
+            <a:solidFill>
+              <a:schemeClr val="tx1"/>
+            </a:solidFill>
+          </a:ln>
+        </p:spPr>
+        <p:style>
+          <a:lnRef idx="1">
+            <a:schemeClr val="accent1"/>
+          </a:lnRef>
+          <a:fillRef idx="0">
+            <a:schemeClr val="accent1"/>
+          </a:fillRef>
+          <a:effectRef idx="0">
+            <a:schemeClr val="accent1"/>
+          </a:effectRef>
+          <a:fontRef idx="minor">
+            <a:schemeClr val="tx1"/>
+          </a:fontRef>
+        </p:style>
+      </p:cxnSp>
+      <p:cxnSp>
+        <p:nvCxnSpPr>
+          <p:cNvPr id="106" name="Connecteur droit 105"/>
+          <p:cNvCxnSpPr/>
+          <p:nvPr/>
+        </p:nvCxnSpPr>
+        <p:spPr>
+          <a:xfrm>
+            <a:off x="4150446" y="4890686"/>
+            <a:ext cx="809206" cy="0"/>
+          </a:xfrm>
+          <a:prstGeom prst="line">
+            <a:avLst/>
+          </a:prstGeom>
+          <a:ln>
+            <a:solidFill>
+              <a:schemeClr val="tx1"/>
+            </a:solidFill>
+          </a:ln>
+        </p:spPr>
+        <p:style>
+          <a:lnRef idx="1">
+            <a:schemeClr val="accent1"/>
+          </a:lnRef>
+          <a:fillRef idx="0">
+            <a:schemeClr val="accent1"/>
+          </a:fillRef>
+          <a:effectRef idx="0">
+            <a:schemeClr val="accent1"/>
+          </a:effectRef>
+          <a:fontRef idx="minor">
+            <a:schemeClr val="tx1"/>
+          </a:fontRef>
+        </p:style>
+      </p:cxnSp>
+      <p:cxnSp>
+        <p:nvCxnSpPr>
+          <p:cNvPr id="107" name="Connecteur droit 106"/>
+          <p:cNvCxnSpPr>
+            <a:endCxn id="104" idx="0"/>
+          </p:cNvCxnSpPr>
+          <p:nvPr/>
+        </p:nvCxnSpPr>
+        <p:spPr>
+          <a:xfrm>
+            <a:off x="4959652" y="4890686"/>
+            <a:ext cx="0" cy="660687"/>
+          </a:xfrm>
+          <a:prstGeom prst="line">
+            <a:avLst/>
+          </a:prstGeom>
+          <a:ln>
+            <a:solidFill>
+              <a:schemeClr val="tx1"/>
+            </a:solidFill>
+          </a:ln>
+        </p:spPr>
+        <p:style>
+          <a:lnRef idx="1">
+            <a:schemeClr val="accent1"/>
+          </a:lnRef>
+          <a:fillRef idx="0">
+            <a:schemeClr val="accent1"/>
+          </a:fillRef>
+          <a:effectRef idx="0">
+            <a:schemeClr val="accent1"/>
+          </a:effectRef>
+          <a:fontRef idx="minor">
+            <a:schemeClr val="tx1"/>
+          </a:fontRef>
+        </p:style>
+      </p:cxnSp>
+      <p:cxnSp>
+        <p:nvCxnSpPr>
+          <p:cNvPr id="108" name="Connecteur droit 107"/>
+          <p:cNvCxnSpPr>
+            <a:stCxn id="104" idx="4"/>
+          </p:cNvCxnSpPr>
+          <p:nvPr/>
+        </p:nvCxnSpPr>
+        <p:spPr>
+          <a:xfrm>
+            <a:off x="4959652" y="5940639"/>
+            <a:ext cx="0" cy="612263"/>
+          </a:xfrm>
+          <a:prstGeom prst="line">
+            <a:avLst/>
+          </a:prstGeom>
+          <a:ln>
+            <a:solidFill>
+              <a:schemeClr val="tx1"/>
+            </a:solidFill>
+          </a:ln>
+        </p:spPr>
+        <p:style>
+          <a:lnRef idx="1">
+            <a:schemeClr val="accent1"/>
+          </a:lnRef>
+          <a:fillRef idx="0">
+            <a:schemeClr val="accent1"/>
+          </a:fillRef>
+          <a:effectRef idx="0">
+            <a:schemeClr val="accent1"/>
+          </a:effectRef>
+          <a:fontRef idx="minor">
+            <a:schemeClr val="tx1"/>
+          </a:fontRef>
+        </p:style>
+      </p:cxnSp>
+      <p:cxnSp>
+        <p:nvCxnSpPr>
+          <p:cNvPr id="109" name="Connecteur droit 108"/>
+          <p:cNvCxnSpPr/>
+          <p:nvPr/>
+        </p:nvCxnSpPr>
+        <p:spPr>
+          <a:xfrm>
+            <a:off x="4150446" y="6427554"/>
+            <a:ext cx="0" cy="269364"/>
+          </a:xfrm>
+          <a:prstGeom prst="line">
+            <a:avLst/>
+          </a:prstGeom>
+          <a:ln>
+            <a:solidFill>
+              <a:schemeClr val="tx1"/>
+            </a:solidFill>
+          </a:ln>
+        </p:spPr>
+        <p:style>
+          <a:lnRef idx="1">
+            <a:schemeClr val="accent1"/>
+          </a:lnRef>
+          <a:fillRef idx="0">
+            <a:schemeClr val="accent1"/>
+          </a:fillRef>
+          <a:effectRef idx="0">
+            <a:schemeClr val="accent1"/>
+          </a:effectRef>
+          <a:fontRef idx="minor">
+            <a:schemeClr val="tx1"/>
+          </a:fontRef>
+        </p:style>
+      </p:cxnSp>
+      <p:cxnSp>
+        <p:nvCxnSpPr>
+          <p:cNvPr id="110" name="Connecteur droit 109"/>
+          <p:cNvCxnSpPr/>
+          <p:nvPr/>
+        </p:nvCxnSpPr>
+        <p:spPr>
+          <a:xfrm>
+            <a:off x="4150446" y="6552902"/>
+            <a:ext cx="809206" cy="0"/>
+          </a:xfrm>
+          <a:prstGeom prst="line">
+            <a:avLst/>
+          </a:prstGeom>
+          <a:ln>
+            <a:solidFill>
+              <a:schemeClr val="tx1"/>
+            </a:solidFill>
+          </a:ln>
+        </p:spPr>
+        <p:style>
+          <a:lnRef idx="1">
+            <a:schemeClr val="accent1"/>
+          </a:lnRef>
+          <a:fillRef idx="0">
+            <a:schemeClr val="accent1"/>
+          </a:fillRef>
+          <a:effectRef idx="0">
+            <a:schemeClr val="accent1"/>
+          </a:effectRef>
+          <a:fontRef idx="minor">
+            <a:schemeClr val="tx1"/>
+          </a:fontRef>
+        </p:style>
+      </p:cxnSp>
+      <p:sp>
+        <p:nvSpPr>
+          <p:cNvPr id="111" name="Rectangle 110"/>
+          <p:cNvSpPr/>
+          <p:nvPr/>
+        </p:nvSpPr>
+        <p:spPr>
+          <a:xfrm>
+            <a:off x="4791110" y="5515173"/>
+            <a:ext cx="313932" cy="461665"/>
           </a:xfrm>
           <a:prstGeom prst="rect">
             <a:avLst/>
           </a:prstGeom>
-          <a:noFill/>
-        </p:spPr>
-        <p:txBody>
-          <a:bodyPr wrap="none" rtlCol="0">
+          <a:ln>
+            <a:noFill/>
+          </a:ln>
+        </p:spPr>
+        <p:txBody>
+          <a:bodyPr wrap="square">
             <a:spAutoFit/>
           </a:bodyPr>
           <a:lstStyle/>
           <a:p>
             <a:r>
-              <a:rPr lang="fr-FR" sz="2400" dirty="0" smtClean="0">
-                <a:latin typeface="Times New Roman" pitchFamily="18" charset="0"/>
-                <a:cs typeface="Times New Roman" pitchFamily="18" charset="0"/>
-              </a:rPr>
-              <a:t>(b)</a:t>
-            </a:r>
-            <a:endParaRPr lang="fr-FR" sz="2400" dirty="0">
-              <a:latin typeface="Times New Roman" pitchFamily="18" charset="0"/>
-              <a:cs typeface="Times New Roman" pitchFamily="18" charset="0"/>
-            </a:endParaRPr>
-          </a:p>
-        </p:txBody>
-      </p:sp>
-      <p:sp>
-        <p:nvSpPr>
-          <p:cNvPr id="7" name="ZoneTexte 6"/>
-          <p:cNvSpPr txBox="1"/>
+              <a:rPr lang="en-US" sz="2400" dirty="0" smtClean="0"/>
+              <a:t>V</a:t>
+            </a:r>
+            <a:endParaRPr lang="en-US" sz="2400" dirty="0"/>
+          </a:p>
+        </p:txBody>
+      </p:sp>
+      <p:sp>
+        <p:nvSpPr>
+          <p:cNvPr id="112" name="Rectangle 111"/>
+          <p:cNvSpPr/>
           <p:nvPr/>
         </p:nvSpPr>
         <p:spPr>
           <a:xfrm>
-            <a:off x="1494383" y="4723085"/>
-            <a:ext cx="526106" cy="461665"/>
+            <a:off x="1656762" y="5636764"/>
+            <a:ext cx="524083" cy="276999"/>
           </a:xfrm>
           <a:prstGeom prst="rect">
             <a:avLst/>
           </a:prstGeom>
-          <a:noFill/>
-        </p:spPr>
-        <p:txBody>
-          <a:bodyPr wrap="none" rtlCol="0">
+        </p:spPr>
+        <p:txBody>
+          <a:bodyPr wrap="square">
             <a:spAutoFit/>
           </a:bodyPr>
           <a:lstStyle/>
           <a:p>
             <a:r>
-              <a:rPr lang="fr-FR" sz="2400" dirty="0" smtClean="0">
-                <a:latin typeface="Times New Roman" pitchFamily="18" charset="0"/>
-                <a:cs typeface="Times New Roman" pitchFamily="18" charset="0"/>
+              <a:rPr lang="en-US" sz="1200" dirty="0" err="1" smtClean="0">
+                <a:latin typeface="Times New Roman" panose="02020603050405020304" pitchFamily="18" charset="0"/>
+                <a:cs typeface="Times New Roman" panose="02020603050405020304" pitchFamily="18" charset="0"/>
               </a:rPr>
-              <a:t>(c)</a:t>
-            </a:r>
-            <a:endParaRPr lang="fr-FR" sz="2400" dirty="0">
-              <a:latin typeface="Times New Roman" pitchFamily="18" charset="0"/>
-              <a:cs typeface="Times New Roman" pitchFamily="18" charset="0"/>
+              <a:t>CdTe</a:t>
+            </a:r>
+            <a:endParaRPr lang="en-US" sz="1200" dirty="0">
+              <a:latin typeface="Times New Roman" panose="02020603050405020304" pitchFamily="18" charset="0"/>
+              <a:cs typeface="Times New Roman" panose="02020603050405020304" pitchFamily="18" charset="0"/>
             </a:endParaRPr>
           </a:p>
         </p:txBody>
       </p:sp>
+      <p:sp>
+        <p:nvSpPr>
+          <p:cNvPr id="113" name="Rectangle 112"/>
+          <p:cNvSpPr/>
+          <p:nvPr/>
+        </p:nvSpPr>
+        <p:spPr>
+          <a:xfrm>
+            <a:off x="2101357" y="5355626"/>
+            <a:ext cx="1305481" cy="276999"/>
+          </a:xfrm>
+          <a:prstGeom prst="rect">
+            <a:avLst/>
+          </a:prstGeom>
+        </p:spPr>
+        <p:txBody>
+          <a:bodyPr wrap="square">
+            <a:spAutoFit/>
+          </a:bodyPr>
+          <a:lstStyle/>
+          <a:p>
+            <a:r>
+              <a:rPr lang="en-US" sz="1200" dirty="0" err="1" smtClean="0">
+                <a:latin typeface="Times New Roman" panose="02020603050405020304" pitchFamily="18" charset="0"/>
+                <a:cs typeface="Times New Roman" panose="02020603050405020304" pitchFamily="18" charset="0"/>
+              </a:rPr>
+              <a:t>i-ZnTe</a:t>
+            </a:r>
+            <a:r>
+              <a:rPr lang="en-US" sz="1200" dirty="0" smtClean="0">
+                <a:latin typeface="Times New Roman" panose="02020603050405020304" pitchFamily="18" charset="0"/>
+                <a:cs typeface="Times New Roman" panose="02020603050405020304" pitchFamily="18" charset="0"/>
+              </a:rPr>
+              <a:t> (110 nm)</a:t>
+            </a:r>
+            <a:endParaRPr lang="en-US" sz="1200" dirty="0">
+              <a:latin typeface="Times New Roman" panose="02020603050405020304" pitchFamily="18" charset="0"/>
+              <a:cs typeface="Times New Roman" panose="02020603050405020304" pitchFamily="18" charset="0"/>
+            </a:endParaRPr>
+          </a:p>
+        </p:txBody>
+      </p:sp>
+      <p:cxnSp>
+        <p:nvCxnSpPr>
+          <p:cNvPr id="114" name="Connecteur droit 113"/>
+          <p:cNvCxnSpPr/>
+          <p:nvPr/>
+        </p:nvCxnSpPr>
+        <p:spPr>
+          <a:xfrm flipV="1">
+            <a:off x="3996774" y="6696918"/>
+            <a:ext cx="320400" cy="256"/>
+          </a:xfrm>
+          <a:prstGeom prst="line">
+            <a:avLst/>
+          </a:prstGeom>
+          <a:ln>
+            <a:solidFill>
+              <a:schemeClr val="tx1"/>
+            </a:solidFill>
+          </a:ln>
+        </p:spPr>
+        <p:style>
+          <a:lnRef idx="1">
+            <a:schemeClr val="accent1"/>
+          </a:lnRef>
+          <a:fillRef idx="0">
+            <a:schemeClr val="accent1"/>
+          </a:fillRef>
+          <a:effectRef idx="0">
+            <a:schemeClr val="accent1"/>
+          </a:effectRef>
+          <a:fontRef idx="minor">
+            <a:schemeClr val="tx1"/>
+          </a:fontRef>
+        </p:style>
+      </p:cxnSp>
+      <p:cxnSp>
+        <p:nvCxnSpPr>
+          <p:cNvPr id="115" name="Connecteur droit 114"/>
+          <p:cNvCxnSpPr/>
+          <p:nvPr/>
+        </p:nvCxnSpPr>
+        <p:spPr>
+          <a:xfrm flipH="1">
+            <a:off x="3978126" y="6697099"/>
+            <a:ext cx="72000" cy="180000"/>
+          </a:xfrm>
+          <a:prstGeom prst="line">
+            <a:avLst/>
+          </a:prstGeom>
+          <a:ln>
+            <a:solidFill>
+              <a:schemeClr val="tx1"/>
+            </a:solidFill>
+          </a:ln>
+        </p:spPr>
+        <p:style>
+          <a:lnRef idx="1">
+            <a:schemeClr val="accent1"/>
+          </a:lnRef>
+          <a:fillRef idx="0">
+            <a:schemeClr val="accent1"/>
+          </a:fillRef>
+          <a:effectRef idx="0">
+            <a:schemeClr val="accent1"/>
+          </a:effectRef>
+          <a:fontRef idx="minor">
+            <a:schemeClr val="tx1"/>
+          </a:fontRef>
+        </p:style>
+      </p:cxnSp>
+      <p:cxnSp>
+        <p:nvCxnSpPr>
+          <p:cNvPr id="116" name="Connecteur droit 115"/>
+          <p:cNvCxnSpPr/>
+          <p:nvPr/>
+        </p:nvCxnSpPr>
+        <p:spPr>
+          <a:xfrm flipH="1">
+            <a:off x="4189222" y="6697099"/>
+            <a:ext cx="72000" cy="180000"/>
+          </a:xfrm>
+          <a:prstGeom prst="line">
+            <a:avLst/>
+          </a:prstGeom>
+          <a:ln>
+            <a:solidFill>
+              <a:schemeClr val="tx1"/>
+            </a:solidFill>
+          </a:ln>
+        </p:spPr>
+        <p:style>
+          <a:lnRef idx="1">
+            <a:schemeClr val="accent1"/>
+          </a:lnRef>
+          <a:fillRef idx="0">
+            <a:schemeClr val="accent1"/>
+          </a:fillRef>
+          <a:effectRef idx="0">
+            <a:schemeClr val="accent1"/>
+          </a:effectRef>
+          <a:fontRef idx="minor">
+            <a:schemeClr val="tx1"/>
+          </a:fontRef>
+        </p:style>
+      </p:cxnSp>
+      <p:cxnSp>
+        <p:nvCxnSpPr>
+          <p:cNvPr id="117" name="Connecteur droit 116"/>
+          <p:cNvCxnSpPr/>
+          <p:nvPr/>
+        </p:nvCxnSpPr>
+        <p:spPr>
+          <a:xfrm flipH="1">
+            <a:off x="4083674" y="6697099"/>
+            <a:ext cx="72000" cy="180000"/>
+          </a:xfrm>
+          <a:prstGeom prst="line">
+            <a:avLst/>
+          </a:prstGeom>
+          <a:ln>
+            <a:solidFill>
+              <a:schemeClr val="tx1"/>
+            </a:solidFill>
+          </a:ln>
+        </p:spPr>
+        <p:style>
+          <a:lnRef idx="1">
+            <a:schemeClr val="accent1"/>
+          </a:lnRef>
+          <a:fillRef idx="0">
+            <a:schemeClr val="accent1"/>
+          </a:fillRef>
+          <a:effectRef idx="0">
+            <a:schemeClr val="accent1"/>
+          </a:effectRef>
+          <a:fontRef idx="minor">
+            <a:schemeClr val="tx1"/>
+          </a:fontRef>
+        </p:style>
+      </p:cxnSp>
+      <p:cxnSp>
+        <p:nvCxnSpPr>
+          <p:cNvPr id="118" name="Connecteur droit 117"/>
+          <p:cNvCxnSpPr/>
+          <p:nvPr/>
+        </p:nvCxnSpPr>
+        <p:spPr>
+          <a:xfrm flipH="1">
+            <a:off x="4135998" y="6697099"/>
+            <a:ext cx="72000" cy="180000"/>
+          </a:xfrm>
+          <a:prstGeom prst="line">
+            <a:avLst/>
+          </a:prstGeom>
+          <a:ln>
+            <a:solidFill>
+              <a:schemeClr val="tx1"/>
+            </a:solidFill>
+          </a:ln>
+        </p:spPr>
+        <p:style>
+          <a:lnRef idx="1">
+            <a:schemeClr val="accent1"/>
+          </a:lnRef>
+          <a:fillRef idx="0">
+            <a:schemeClr val="accent1"/>
+          </a:fillRef>
+          <a:effectRef idx="0">
+            <a:schemeClr val="accent1"/>
+          </a:effectRef>
+          <a:fontRef idx="minor">
+            <a:schemeClr val="tx1"/>
+          </a:fontRef>
+        </p:style>
+      </p:cxnSp>
+      <p:cxnSp>
+        <p:nvCxnSpPr>
+          <p:cNvPr id="119" name="Connecteur droit 118"/>
+          <p:cNvCxnSpPr/>
+          <p:nvPr/>
+        </p:nvCxnSpPr>
+        <p:spPr>
+          <a:xfrm flipH="1">
+            <a:off x="4031598" y="6696918"/>
+            <a:ext cx="72000" cy="180000"/>
+          </a:xfrm>
+          <a:prstGeom prst="line">
+            <a:avLst/>
+          </a:prstGeom>
+          <a:ln>
+            <a:solidFill>
+              <a:schemeClr val="tx1"/>
+            </a:solidFill>
+          </a:ln>
+        </p:spPr>
+        <p:style>
+          <a:lnRef idx="1">
+            <a:schemeClr val="accent1"/>
+          </a:lnRef>
+          <a:fillRef idx="0">
+            <a:schemeClr val="accent1"/>
+          </a:fillRef>
+          <a:effectRef idx="0">
+            <a:schemeClr val="accent1"/>
+          </a:effectRef>
+          <a:fontRef idx="minor">
+            <a:schemeClr val="tx1"/>
+          </a:fontRef>
+        </p:style>
+      </p:cxnSp>
+      <p:cxnSp>
+        <p:nvCxnSpPr>
+          <p:cNvPr id="120" name="Connecteur droit 119"/>
+          <p:cNvCxnSpPr/>
+          <p:nvPr/>
+        </p:nvCxnSpPr>
+        <p:spPr>
+          <a:xfrm flipH="1">
+            <a:off x="4245174" y="6696993"/>
+            <a:ext cx="72000" cy="180000"/>
+          </a:xfrm>
+          <a:prstGeom prst="line">
+            <a:avLst/>
+          </a:prstGeom>
+          <a:ln>
+            <a:solidFill>
+              <a:schemeClr val="tx1"/>
+            </a:solidFill>
+          </a:ln>
+        </p:spPr>
+        <p:style>
+          <a:lnRef idx="1">
+            <a:schemeClr val="accent1"/>
+          </a:lnRef>
+          <a:fillRef idx="0">
+            <a:schemeClr val="accent1"/>
+          </a:fillRef>
+          <a:effectRef idx="0">
+            <a:schemeClr val="accent1"/>
+          </a:effectRef>
+          <a:fontRef idx="minor">
+            <a:schemeClr val="tx1"/>
+          </a:fontRef>
+        </p:style>
+      </p:cxnSp>
+      <p:cxnSp>
+        <p:nvCxnSpPr>
+          <p:cNvPr id="121" name="Connecteur droit 120"/>
+          <p:cNvCxnSpPr/>
+          <p:nvPr/>
+        </p:nvCxnSpPr>
+        <p:spPr>
+          <a:xfrm flipH="1">
+            <a:off x="3924774" y="6696993"/>
+            <a:ext cx="72000" cy="180000"/>
+          </a:xfrm>
+          <a:prstGeom prst="line">
+            <a:avLst/>
+          </a:prstGeom>
+          <a:ln>
+            <a:solidFill>
+              <a:schemeClr val="tx1"/>
+            </a:solidFill>
+          </a:ln>
+        </p:spPr>
+        <p:style>
+          <a:lnRef idx="1">
+            <a:schemeClr val="accent1"/>
+          </a:lnRef>
+          <a:fillRef idx="0">
+            <a:schemeClr val="accent1"/>
+          </a:fillRef>
+          <a:effectRef idx="0">
+            <a:schemeClr val="accent1"/>
+          </a:effectRef>
+          <a:fontRef idx="minor">
+            <a:schemeClr val="tx1"/>
+          </a:fontRef>
+        </p:style>
+      </p:cxnSp>
     </p:spTree>
     <p:extLst>
       <p:ext uri="{BB962C8B-B14F-4D97-AF65-F5344CB8AC3E}">

</xml_diff>